<commit_message>
Updated test_fig3 and test_fig4
</commit_message>
<xml_diff>
--- a/doc/Quanty Demo.pptx
+++ b/doc/Quanty Demo.pptx
@@ -266,7 +266,7 @@
           <a:p>
             <a:fld id="{A723523A-0C2E-494D-A67E-57B2EDDBBC5A}" type="datetimeFigureOut">
               <a:rPr lang="en-US" smtClean="0"/>
-              <a:t>7/15/2016</a:t>
+              <a:t>2/17/2017</a:t>
             </a:fld>
             <a:endParaRPr lang="en-US"/>
           </a:p>
@@ -436,7 +436,7 @@
           <a:p>
             <a:fld id="{A723523A-0C2E-494D-A67E-57B2EDDBBC5A}" type="datetimeFigureOut">
               <a:rPr lang="en-US" smtClean="0"/>
-              <a:t>7/15/2016</a:t>
+              <a:t>2/17/2017</a:t>
             </a:fld>
             <a:endParaRPr lang="en-US"/>
           </a:p>
@@ -616,7 +616,7 @@
           <a:p>
             <a:fld id="{A723523A-0C2E-494D-A67E-57B2EDDBBC5A}" type="datetimeFigureOut">
               <a:rPr lang="en-US" smtClean="0"/>
-              <a:t>7/15/2016</a:t>
+              <a:t>2/17/2017</a:t>
             </a:fld>
             <a:endParaRPr lang="en-US"/>
           </a:p>
@@ -786,7 +786,7 @@
           <a:p>
             <a:fld id="{A723523A-0C2E-494D-A67E-57B2EDDBBC5A}" type="datetimeFigureOut">
               <a:rPr lang="en-US" smtClean="0"/>
-              <a:t>7/15/2016</a:t>
+              <a:t>2/17/2017</a:t>
             </a:fld>
             <a:endParaRPr lang="en-US"/>
           </a:p>
@@ -1032,7 +1032,7 @@
           <a:p>
             <a:fld id="{A723523A-0C2E-494D-A67E-57B2EDDBBC5A}" type="datetimeFigureOut">
               <a:rPr lang="en-US" smtClean="0"/>
-              <a:t>7/15/2016</a:t>
+              <a:t>2/17/2017</a:t>
             </a:fld>
             <a:endParaRPr lang="en-US"/>
           </a:p>
@@ -1264,7 +1264,7 @@
           <a:p>
             <a:fld id="{A723523A-0C2E-494D-A67E-57B2EDDBBC5A}" type="datetimeFigureOut">
               <a:rPr lang="en-US" smtClean="0"/>
-              <a:t>7/15/2016</a:t>
+              <a:t>2/17/2017</a:t>
             </a:fld>
             <a:endParaRPr lang="en-US"/>
           </a:p>
@@ -1631,7 +1631,7 @@
           <a:p>
             <a:fld id="{A723523A-0C2E-494D-A67E-57B2EDDBBC5A}" type="datetimeFigureOut">
               <a:rPr lang="en-US" smtClean="0"/>
-              <a:t>7/15/2016</a:t>
+              <a:t>2/17/2017</a:t>
             </a:fld>
             <a:endParaRPr lang="en-US"/>
           </a:p>
@@ -1749,7 +1749,7 @@
           <a:p>
             <a:fld id="{A723523A-0C2E-494D-A67E-57B2EDDBBC5A}" type="datetimeFigureOut">
               <a:rPr lang="en-US" smtClean="0"/>
-              <a:t>7/15/2016</a:t>
+              <a:t>2/17/2017</a:t>
             </a:fld>
             <a:endParaRPr lang="en-US"/>
           </a:p>
@@ -1844,7 +1844,7 @@
           <a:p>
             <a:fld id="{A723523A-0C2E-494D-A67E-57B2EDDBBC5A}" type="datetimeFigureOut">
               <a:rPr lang="en-US" smtClean="0"/>
-              <a:t>7/15/2016</a:t>
+              <a:t>2/17/2017</a:t>
             </a:fld>
             <a:endParaRPr lang="en-US"/>
           </a:p>
@@ -2121,7 +2121,7 @@
           <a:p>
             <a:fld id="{A723523A-0C2E-494D-A67E-57B2EDDBBC5A}" type="datetimeFigureOut">
               <a:rPr lang="en-US" smtClean="0"/>
-              <a:t>7/15/2016</a:t>
+              <a:t>2/17/2017</a:t>
             </a:fld>
             <a:endParaRPr lang="en-US"/>
           </a:p>
@@ -2374,7 +2374,7 @@
           <a:p>
             <a:fld id="{A723523A-0C2E-494D-A67E-57B2EDDBBC5A}" type="datetimeFigureOut">
               <a:rPr lang="en-US" smtClean="0"/>
-              <a:t>7/15/2016</a:t>
+              <a:t>2/17/2017</a:t>
             </a:fld>
             <a:endParaRPr lang="en-US"/>
           </a:p>
@@ -2587,7 +2587,7 @@
           <a:p>
             <a:fld id="{A723523A-0C2E-494D-A67E-57B2EDDBBC5A}" type="datetimeFigureOut">
               <a:rPr lang="en-US" smtClean="0"/>
-              <a:t>7/15/2016</a:t>
+              <a:t>2/17/2017</a:t>
             </a:fld>
             <a:endParaRPr lang="en-US"/>
           </a:p>

</xml_diff>

<commit_message>
Improved the Quanty User's Guide and clean up.
</commit_message>
<xml_diff>
--- a/doc/Quanty Demo.pptx
+++ b/doc/Quanty Demo.pptx
@@ -266,7 +266,7 @@
           <a:p>
             <a:fld id="{A723523A-0C2E-494D-A67E-57B2EDDBBC5A}" type="datetimeFigureOut">
               <a:rPr lang="en-US" smtClean="0"/>
-              <a:t>2/17/2017</a:t>
+              <a:t>5/10/17</a:t>
             </a:fld>
             <a:endParaRPr lang="en-US"/>
           </a:p>
@@ -436,7 +436,7 @@
           <a:p>
             <a:fld id="{A723523A-0C2E-494D-A67E-57B2EDDBBC5A}" type="datetimeFigureOut">
               <a:rPr lang="en-US" smtClean="0"/>
-              <a:t>2/17/2017</a:t>
+              <a:t>5/10/17</a:t>
             </a:fld>
             <a:endParaRPr lang="en-US"/>
           </a:p>
@@ -616,7 +616,7 @@
           <a:p>
             <a:fld id="{A723523A-0C2E-494D-A67E-57B2EDDBBC5A}" type="datetimeFigureOut">
               <a:rPr lang="en-US" smtClean="0"/>
-              <a:t>2/17/2017</a:t>
+              <a:t>5/10/17</a:t>
             </a:fld>
             <a:endParaRPr lang="en-US"/>
           </a:p>
@@ -786,7 +786,7 @@
           <a:p>
             <a:fld id="{A723523A-0C2E-494D-A67E-57B2EDDBBC5A}" type="datetimeFigureOut">
               <a:rPr lang="en-US" smtClean="0"/>
-              <a:t>2/17/2017</a:t>
+              <a:t>5/10/17</a:t>
             </a:fld>
             <a:endParaRPr lang="en-US"/>
           </a:p>
@@ -1032,7 +1032,7 @@
           <a:p>
             <a:fld id="{A723523A-0C2E-494D-A67E-57B2EDDBBC5A}" type="datetimeFigureOut">
               <a:rPr lang="en-US" smtClean="0"/>
-              <a:t>2/17/2017</a:t>
+              <a:t>5/10/17</a:t>
             </a:fld>
             <a:endParaRPr lang="en-US"/>
           </a:p>
@@ -1264,7 +1264,7 @@
           <a:p>
             <a:fld id="{A723523A-0C2E-494D-A67E-57B2EDDBBC5A}" type="datetimeFigureOut">
               <a:rPr lang="en-US" smtClean="0"/>
-              <a:t>2/17/2017</a:t>
+              <a:t>5/10/17</a:t>
             </a:fld>
             <a:endParaRPr lang="en-US"/>
           </a:p>
@@ -1631,7 +1631,7 @@
           <a:p>
             <a:fld id="{A723523A-0C2E-494D-A67E-57B2EDDBBC5A}" type="datetimeFigureOut">
               <a:rPr lang="en-US" smtClean="0"/>
-              <a:t>2/17/2017</a:t>
+              <a:t>5/10/17</a:t>
             </a:fld>
             <a:endParaRPr lang="en-US"/>
           </a:p>
@@ -1749,7 +1749,7 @@
           <a:p>
             <a:fld id="{A723523A-0C2E-494D-A67E-57B2EDDBBC5A}" type="datetimeFigureOut">
               <a:rPr lang="en-US" smtClean="0"/>
-              <a:t>2/17/2017</a:t>
+              <a:t>5/10/17</a:t>
             </a:fld>
             <a:endParaRPr lang="en-US"/>
           </a:p>
@@ -1844,7 +1844,7 @@
           <a:p>
             <a:fld id="{A723523A-0C2E-494D-A67E-57B2EDDBBC5A}" type="datetimeFigureOut">
               <a:rPr lang="en-US" smtClean="0"/>
-              <a:t>2/17/2017</a:t>
+              <a:t>5/10/17</a:t>
             </a:fld>
             <a:endParaRPr lang="en-US"/>
           </a:p>
@@ -2121,7 +2121,7 @@
           <a:p>
             <a:fld id="{A723523A-0C2E-494D-A67E-57B2EDDBBC5A}" type="datetimeFigureOut">
               <a:rPr lang="en-US" smtClean="0"/>
-              <a:t>2/17/2017</a:t>
+              <a:t>5/10/17</a:t>
             </a:fld>
             <a:endParaRPr lang="en-US"/>
           </a:p>
@@ -2374,7 +2374,7 @@
           <a:p>
             <a:fld id="{A723523A-0C2E-494D-A67E-57B2EDDBBC5A}" type="datetimeFigureOut">
               <a:rPr lang="en-US" smtClean="0"/>
-              <a:t>2/17/2017</a:t>
+              <a:t>5/10/17</a:t>
             </a:fld>
             <a:endParaRPr lang="en-US"/>
           </a:p>
@@ -2587,7 +2587,7 @@
           <a:p>
             <a:fld id="{A723523A-0C2E-494D-A67E-57B2EDDBBC5A}" type="datetimeFigureOut">
               <a:rPr lang="en-US" smtClean="0"/>
-              <a:t>2/17/2017</a:t>
+              <a:t>5/10/17</a:t>
             </a:fld>
             <a:endParaRPr lang="en-US"/>
           </a:p>

</xml_diff>